<commit_message>
initial edits for screening and assessments
</commit_message>
<xml_diff>
--- a/input/images-source/AssessmentDiagrams_USCore_C-CDA_USCDIv3-generic.pptx
+++ b/input/images-source/AssessmentDiagrams_USCore_C-CDA_USCDIv3-generic.pptx
@@ -26228,7 +26228,7 @@
         <p:spPr>
           <a:xfrm>
             <a:off x="5311260" y="821662"/>
-            <a:ext cx="4562483" cy="307736"/>
+            <a:ext cx="4562483" cy="738623"/>
           </a:xfrm>
           <a:prstGeom prst="rect">
             <a:avLst/>
@@ -26269,7 +26269,53 @@
                 <a:cs typeface="Calibri"/>
                 <a:sym typeface="Calibri"/>
               </a:rPr>
-              <a:t>US Core Screening and Assessments Observation Profile</a:t>
+              <a:t>US Core Screening and Assessment Component Observation</a:t>
+            </a:r>
+          </a:p>
+          <a:p>
+            <a:pPr marL="0" marR="0" lvl="0" indent="0" algn="l" rtl="0">
+              <a:spcBef>
+                <a:spcPts val="0"/>
+              </a:spcBef>
+              <a:spcAft>
+                <a:spcPts val="0"/>
+              </a:spcAft>
+              <a:buNone/>
+            </a:pPr>
+            <a:r>
+              <a:rPr lang="en-US" dirty="0">
+                <a:solidFill>
+                  <a:schemeClr val="dk1"/>
+                </a:solidFill>
+                <a:latin typeface="Calibri"/>
+                <a:ea typeface="Calibri"/>
+                <a:cs typeface="Calibri"/>
+                <a:sym typeface="Calibri"/>
+              </a:rPr>
+              <a:t>US Core Screening and Assessment Panel Observation</a:t>
+            </a:r>
+          </a:p>
+          <a:p>
+            <a:pPr marL="0" marR="0" lvl="0" indent="0" algn="l" rtl="0">
+              <a:spcBef>
+                <a:spcPts val="0"/>
+              </a:spcBef>
+              <a:spcAft>
+                <a:spcPts val="0"/>
+              </a:spcAft>
+              <a:buNone/>
+            </a:pPr>
+            <a:r>
+              <a:rPr lang="en-US" sz="1400" b="0" i="0" u="none" strike="noStrike" cap="none" dirty="0">
+                <a:solidFill>
+                  <a:schemeClr val="dk1"/>
+                </a:solidFill>
+                <a:latin typeface="Calibri"/>
+                <a:ea typeface="Calibri"/>
+                <a:cs typeface="Calibri"/>
+                <a:sym typeface="Calibri"/>
+              </a:rPr>
+              <a:t>US Core Clinical Judgment Observation</a:t>
             </a:r>
           </a:p>
         </p:txBody>

</xml_diff>

<commit_message>
updated screening and assessment guidance
</commit_message>
<xml_diff>
--- a/input/images-source/AssessmentDiagrams_USCore_C-CDA_USCDIv3-generic.pptx
+++ b/input/images-source/AssessmentDiagrams_USCore_C-CDA_USCDIv3-generic.pptx
@@ -26228,7 +26228,7 @@
         <p:spPr>
           <a:xfrm>
             <a:off x="5311260" y="821662"/>
-            <a:ext cx="4562483" cy="738623"/>
+            <a:ext cx="4562483" cy="523180"/>
           </a:xfrm>
           <a:prstGeom prst="rect">
             <a:avLst/>
@@ -26269,7 +26269,7 @@
                 <a:cs typeface="Calibri"/>
                 <a:sym typeface="Calibri"/>
               </a:rPr>
-              <a:t>US Core Screening and Assessment Component Observation</a:t>
+              <a:t>US Core Observation Screening Assessments Profile</a:t>
             </a:r>
           </a:p>
           <a:p>
@@ -26283,7 +26283,7 @@
               <a:buNone/>
             </a:pPr>
             <a:r>
-              <a:rPr lang="en-US" dirty="0">
+              <a:rPr lang="en-US" sz="1400" b="0" i="0" u="none" strike="noStrike" cap="none">
                 <a:solidFill>
                   <a:schemeClr val="dk1"/>
                 </a:solidFill>
@@ -26292,31 +26292,17 @@
                 <a:cs typeface="Calibri"/>
                 <a:sym typeface="Calibri"/>
               </a:rPr>
-              <a:t>US Core Screening and Assessment Panel Observation</a:t>
+              <a:t>US Core Observation Clinical Judgment Profile</a:t>
             </a:r>
-          </a:p>
-          <a:p>
-            <a:pPr marL="0" marR="0" lvl="0" indent="0" algn="l" rtl="0">
-              <a:spcBef>
-                <a:spcPts val="0"/>
-              </a:spcBef>
-              <a:spcAft>
-                <a:spcPts val="0"/>
-              </a:spcAft>
-              <a:buNone/>
-            </a:pPr>
-            <a:r>
-              <a:rPr lang="en-US" sz="1400" b="0" i="0" u="none" strike="noStrike" cap="none" dirty="0">
-                <a:solidFill>
-                  <a:schemeClr val="dk1"/>
-                </a:solidFill>
-                <a:latin typeface="Calibri"/>
-                <a:ea typeface="Calibri"/>
-                <a:cs typeface="Calibri"/>
-                <a:sym typeface="Calibri"/>
-              </a:rPr>
-              <a:t>US Core Clinical Judgment Observation</a:t>
-            </a:r>
+            <a:endParaRPr lang="en-US" sz="1400" b="0" i="0" u="none" strike="noStrike" cap="none" dirty="0">
+              <a:solidFill>
+                <a:schemeClr val="dk1"/>
+              </a:solidFill>
+              <a:latin typeface="Calibri"/>
+              <a:ea typeface="Calibri"/>
+              <a:cs typeface="Calibri"/>
+              <a:sym typeface="Calibri"/>
+            </a:endParaRPr>
           </a:p>
         </p:txBody>
       </p:sp>

</xml_diff>

<commit_message>
**Pre-Applied:** Remove US Core QuestionnaireResponse Tag Element [FHIR-40742]
</commit_message>
<xml_diff>
--- a/input/images-source/AssessmentDiagrams_USCore_C-CDA_USCDIv3-generic.pptx
+++ b/input/images-source/AssessmentDiagrams_USCore_C-CDA_USCDIv3-generic.pptx
@@ -26228,7 +26228,7 @@
         <p:spPr>
           <a:xfrm>
             <a:off x="5311260" y="821662"/>
-            <a:ext cx="4562483" cy="523180"/>
+            <a:ext cx="5041430" cy="738623"/>
           </a:xfrm>
           <a:prstGeom prst="rect">
             <a:avLst/>
@@ -26250,6 +26250,18 @@
           </a:bodyPr>
           <a:lstStyle/>
           <a:p>
+            <a:r>
+              <a:rPr lang="en-US" b="0" i="0" dirty="0">
+                <a:solidFill>
+                  <a:srgbClr val="172B4D"/>
+                </a:solidFill>
+                <a:effectLst/>
+                <a:latin typeface="-apple-system"/>
+              </a:rPr>
+              <a:t>US Core Simple Observation Profile</a:t>
+            </a:r>
+          </a:p>
+          <a:p>
             <a:pPr marL="0" marR="0" lvl="0" indent="0" algn="l" rtl="0">
               <a:spcBef>
                 <a:spcPts val="0"/>
@@ -26283,7 +26295,7 @@
               <a:buNone/>
             </a:pPr>
             <a:r>
-              <a:rPr lang="en-US" sz="1400" b="0" i="0" u="none" strike="noStrike" cap="none">
+              <a:rPr lang="en-US" sz="1400" b="0" i="0" u="none" strike="noStrike" cap="none" dirty="0">
                 <a:solidFill>
                   <a:schemeClr val="dk1"/>
                 </a:solidFill>
@@ -26292,17 +26304,32 @@
                 <a:cs typeface="Calibri"/>
                 <a:sym typeface="Calibri"/>
               </a:rPr>
-              <a:t>US Core Observation Clinical Judgment Profile</a:t>
+              <a:t>SDC Base Questionnaire/US Core </a:t>
             </a:r>
-            <a:endParaRPr lang="en-US" sz="1400" b="0" i="0" u="none" strike="noStrike" cap="none" dirty="0">
-              <a:solidFill>
-                <a:schemeClr val="dk1"/>
-              </a:solidFill>
-              <a:latin typeface="Calibri"/>
-              <a:ea typeface="Calibri"/>
-              <a:cs typeface="Calibri"/>
-              <a:sym typeface="Calibri"/>
-            </a:endParaRPr>
+            <a:r>
+              <a:rPr lang="en-US" sz="1400" b="0" i="0" u="none" strike="noStrike" cap="none" dirty="0" err="1">
+                <a:solidFill>
+                  <a:schemeClr val="dk1"/>
+                </a:solidFill>
+                <a:latin typeface="Calibri"/>
+                <a:ea typeface="Calibri"/>
+                <a:cs typeface="Calibri"/>
+                <a:sym typeface="Calibri"/>
+              </a:rPr>
+              <a:t>QuestionnaireResponse</a:t>
+            </a:r>
+            <a:r>
+              <a:rPr lang="en-US" sz="1400" b="0" i="0" u="none" strike="noStrike" cap="none" dirty="0">
+                <a:solidFill>
+                  <a:schemeClr val="dk1"/>
+                </a:solidFill>
+                <a:latin typeface="Calibri"/>
+                <a:ea typeface="Calibri"/>
+                <a:cs typeface="Calibri"/>
+                <a:sym typeface="Calibri"/>
+              </a:rPr>
+              <a:t> Profile</a:t>
+            </a:r>
           </a:p>
         </p:txBody>
       </p:sp>

</xml_diff>

<commit_message>
Provide further guidance on use of US Core vs other domain specific IGs [FHIR-39943],Update the Screening and Assessment Activities diagram [FHIR-39945],Update Screening and Assessments” title and content [FHIR-39947]
</commit_message>
<xml_diff>
--- a/input/images-source/AssessmentDiagrams_USCore_C-CDA_USCDIv3-generic.pptx
+++ b/input/images-source/AssessmentDiagrams_USCore_C-CDA_USCDIv3-generic.pptx
@@ -26181,7 +26181,7 @@
           <a:p>
             <a:pPr algn="ctr"/>
             <a:r>
-              <a:rPr lang="en-US" sz="1700" b="0" i="0" u="none" strike="noStrike" cap="none" dirty="0">
+              <a:rPr lang="en-US" sz="1700" dirty="0">
                 <a:solidFill>
                   <a:schemeClr val="lt1"/>
                 </a:solidFill>
@@ -26190,19 +26190,11 @@
                 <a:cs typeface="Calibri"/>
                 <a:sym typeface="Calibri"/>
               </a:rPr>
-              <a:t>Screening and Assessments </a:t>
+              <a:t>Assessment and Care</a:t>
             </a:r>
           </a:p>
           <a:p>
-            <a:pPr marL="0" marR="0" lvl="0" indent="0" algn="ctr" rtl="0">
-              <a:spcBef>
-                <a:spcPts val="0"/>
-              </a:spcBef>
-              <a:spcAft>
-                <a:spcPts val="0"/>
-              </a:spcAft>
-              <a:buNone/>
-            </a:pPr>
+            <a:pPr algn="ctr"/>
             <a:r>
               <a:rPr lang="en-US" sz="1700" b="0" i="0" u="none" strike="noStrike" cap="none" dirty="0">
                 <a:solidFill>
@@ -26213,9 +26205,9 @@
                 <a:cs typeface="Calibri"/>
                 <a:sym typeface="Calibri"/>
               </a:rPr>
-              <a:t> Activities</a:t>
+              <a:t>Activities</a:t>
             </a:r>
-            <a:endParaRPr sz="1700" dirty="0"/>
+            <a:endParaRPr lang="en-US" sz="1700" dirty="0"/>
           </a:p>
         </p:txBody>
       </p:sp>
@@ -29977,7 +29969,7 @@
               <a:buNone/>
             </a:pPr>
             <a:r>
-              <a:rPr lang="en-US" sz="1900" b="1" i="0" u="none" strike="noStrike" cap="none">
+              <a:rPr lang="en-US" sz="1900" b="1" i="0" u="none" strike="noStrike" cap="none" dirty="0">
                 <a:solidFill>
                   <a:schemeClr val="dk1"/>
                 </a:solidFill>
@@ -29989,7 +29981,7 @@
               <a:t>US Core </a:t>
             </a:r>
             <a:r>
-              <a:rPr lang="en-US" sz="1900" b="1">
+              <a:rPr lang="en-US" sz="1900" b="1" dirty="0">
                 <a:solidFill>
                   <a:schemeClr val="dk1"/>
                 </a:solidFill>
@@ -29998,10 +29990,10 @@
                 <a:cs typeface="Calibri"/>
                 <a:sym typeface="Calibri"/>
               </a:rPr>
-              <a:t>Observation Survey </a:t>
+              <a:t>Observation Screening Assessment </a:t>
             </a:r>
             <a:r>
-              <a:rPr lang="en-US" sz="1900" b="1" i="0" u="none" strike="noStrike" cap="none">
+              <a:rPr lang="en-US" sz="1900" b="1" i="0" u="none" strike="noStrike" cap="none" dirty="0">
                 <a:solidFill>
                   <a:schemeClr val="dk1"/>
                 </a:solidFill>
@@ -30012,7 +30004,7 @@
               </a:rPr>
               <a:t>Profiles</a:t>
             </a:r>
-            <a:endParaRPr sz="1900" b="0" i="0" u="none" strike="noStrike" cap="none">
+            <a:endParaRPr sz="1900" b="0" i="0" u="none" strike="noStrike" cap="none" dirty="0">
               <a:solidFill>
                 <a:srgbClr val="000000"/>
               </a:solidFill>

</xml_diff>